<commit_message>
Update Erstanmeldung in Sametime.pptx
</commit_message>
<xml_diff>
--- a/hcl-knowledgebase/resources/Erstanmeldung in Sametime.pptx
+++ b/hcl-knowledgebase/resources/Erstanmeldung in Sametime.pptx
@@ -122,14 +122,6 @@
 <p188:authorLst xmlns:a="http://schemas.openxmlformats.org/drawingml/2006/main" xmlns:r="http://schemas.openxmlformats.org/officeDocument/2006/relationships" xmlns:p188="http://schemas.microsoft.com/office/powerpoint/2018/8/main">
   <p188:author id="{05B9D13A-61D2-72D1-584E-06BD671064FB}" name="Jil Steffens" initials="JS" userId="S::jil.steffens@cajuum.de::65e2580a-9c64-4cc4-bd33-c826d77cb174" providerId="AD"/>
 </p188:authorLst>
-</file>
-
-<file path=ppt/revisionInfo.xml><?xml version="1.0" encoding="utf-8"?>
-<p1510:revInfo xmlns:a="http://schemas.openxmlformats.org/drawingml/2006/main" xmlns:r="http://schemas.openxmlformats.org/officeDocument/2006/relationships" xmlns:p1510="http://schemas.microsoft.com/office/powerpoint/2015/10/main">
-  <p1510:revLst>
-    <p1510:client id="{7DC5A3A3-9768-4AC6-8515-815094FCB696}" v="1" dt="2024-07-10T12:02:19.679"/>
-  </p1510:revLst>
-</p1510:revInfo>
 </file>
 
 <file path=ppt/changesInfos/changesInfo1.xml><?xml version="1.0" encoding="utf-8"?>
@@ -500,6 +492,30 @@
       </pc:sldChg>
     </pc:docChg>
   </pc:docChgLst>
+  <pc:docChgLst>
+    <pc:chgData name="Jil Steffens" userId="65e2580a-9c64-4cc4-bd33-c826d77cb174" providerId="ADAL" clId="{3495ECA2-86DF-4AC5-B90F-6899480CECF7}"/>
+    <pc:docChg chg="modSld">
+      <pc:chgData name="Jil Steffens" userId="65e2580a-9c64-4cc4-bd33-c826d77cb174" providerId="ADAL" clId="{3495ECA2-86DF-4AC5-B90F-6899480CECF7}" dt="2024-07-24T09:08:17.400" v="9" actId="20577"/>
+      <pc:docMkLst>
+        <pc:docMk/>
+      </pc:docMkLst>
+      <pc:sldChg chg="modSp mod">
+        <pc:chgData name="Jil Steffens" userId="65e2580a-9c64-4cc4-bd33-c826d77cb174" providerId="ADAL" clId="{3495ECA2-86DF-4AC5-B90F-6899480CECF7}" dt="2024-07-24T09:08:17.400" v="9" actId="20577"/>
+        <pc:sldMkLst>
+          <pc:docMk/>
+          <pc:sldMk cId="2601573138" sldId="256"/>
+        </pc:sldMkLst>
+        <pc:spChg chg="mod">
+          <ac:chgData name="Jil Steffens" userId="65e2580a-9c64-4cc4-bd33-c826d77cb174" providerId="ADAL" clId="{3495ECA2-86DF-4AC5-B90F-6899480CECF7}" dt="2024-07-24T09:08:17.400" v="9" actId="20577"/>
+          <ac:spMkLst>
+            <pc:docMk/>
+            <pc:sldMk cId="2601573138" sldId="256"/>
+            <ac:spMk id="3" creationId="{0286901D-31EC-D38A-DD1D-7B3AD2FDB69C}"/>
+          </ac:spMkLst>
+        </pc:spChg>
+      </pc:sldChg>
+    </pc:docChg>
+  </pc:docChgLst>
 </pc:chgInfo>
 </file>
 
@@ -671,7 +687,7 @@
           <a:p>
             <a:fld id="{959724B9-AEF0-41ED-A786-F2279D2B520B}" type="datetimeFigureOut">
               <a:rPr lang="de-DE" smtClean="0"/>
-              <a:t>10.07.2024</a:t>
+              <a:t>24.07.2024</a:t>
             </a:fld>
             <a:endParaRPr lang="de-DE"/>
           </a:p>
@@ -869,7 +885,7 @@
           <a:p>
             <a:fld id="{959724B9-AEF0-41ED-A786-F2279D2B520B}" type="datetimeFigureOut">
               <a:rPr lang="de-DE" smtClean="0"/>
-              <a:t>10.07.2024</a:t>
+              <a:t>24.07.2024</a:t>
             </a:fld>
             <a:endParaRPr lang="de-DE"/>
           </a:p>
@@ -1077,7 +1093,7 @@
           <a:p>
             <a:fld id="{959724B9-AEF0-41ED-A786-F2279D2B520B}" type="datetimeFigureOut">
               <a:rPr lang="de-DE" smtClean="0"/>
-              <a:t>10.07.2024</a:t>
+              <a:t>24.07.2024</a:t>
             </a:fld>
             <a:endParaRPr lang="de-DE"/>
           </a:p>
@@ -1275,7 +1291,7 @@
           <a:p>
             <a:fld id="{959724B9-AEF0-41ED-A786-F2279D2B520B}" type="datetimeFigureOut">
               <a:rPr lang="de-DE" smtClean="0"/>
-              <a:t>10.07.2024</a:t>
+              <a:t>24.07.2024</a:t>
             </a:fld>
             <a:endParaRPr lang="de-DE"/>
           </a:p>
@@ -1550,7 +1566,7 @@
           <a:p>
             <a:fld id="{959724B9-AEF0-41ED-A786-F2279D2B520B}" type="datetimeFigureOut">
               <a:rPr lang="de-DE" smtClean="0"/>
-              <a:t>10.07.2024</a:t>
+              <a:t>24.07.2024</a:t>
             </a:fld>
             <a:endParaRPr lang="de-DE"/>
           </a:p>
@@ -1815,7 +1831,7 @@
           <a:p>
             <a:fld id="{959724B9-AEF0-41ED-A786-F2279D2B520B}" type="datetimeFigureOut">
               <a:rPr lang="de-DE" smtClean="0"/>
-              <a:t>10.07.2024</a:t>
+              <a:t>24.07.2024</a:t>
             </a:fld>
             <a:endParaRPr lang="de-DE"/>
           </a:p>
@@ -2227,7 +2243,7 @@
           <a:p>
             <a:fld id="{959724B9-AEF0-41ED-A786-F2279D2B520B}" type="datetimeFigureOut">
               <a:rPr lang="de-DE" smtClean="0"/>
-              <a:t>10.07.2024</a:t>
+              <a:t>24.07.2024</a:t>
             </a:fld>
             <a:endParaRPr lang="de-DE"/>
           </a:p>
@@ -2368,7 +2384,7 @@
           <a:p>
             <a:fld id="{959724B9-AEF0-41ED-A786-F2279D2B520B}" type="datetimeFigureOut">
               <a:rPr lang="de-DE" smtClean="0"/>
-              <a:t>10.07.2024</a:t>
+              <a:t>24.07.2024</a:t>
             </a:fld>
             <a:endParaRPr lang="de-DE"/>
           </a:p>
@@ -2481,7 +2497,7 @@
           <a:p>
             <a:fld id="{959724B9-AEF0-41ED-A786-F2279D2B520B}" type="datetimeFigureOut">
               <a:rPr lang="de-DE" smtClean="0"/>
-              <a:t>10.07.2024</a:t>
+              <a:t>24.07.2024</a:t>
             </a:fld>
             <a:endParaRPr lang="de-DE"/>
           </a:p>
@@ -2792,7 +2808,7 @@
           <a:p>
             <a:fld id="{959724B9-AEF0-41ED-A786-F2279D2B520B}" type="datetimeFigureOut">
               <a:rPr lang="de-DE" smtClean="0"/>
-              <a:t>10.07.2024</a:t>
+              <a:t>24.07.2024</a:t>
             </a:fld>
             <a:endParaRPr lang="de-DE"/>
           </a:p>
@@ -3080,7 +3096,7 @@
           <a:p>
             <a:fld id="{959724B9-AEF0-41ED-A786-F2279D2B520B}" type="datetimeFigureOut">
               <a:rPr lang="de-DE" smtClean="0"/>
-              <a:t>10.07.2024</a:t>
+              <a:t>24.07.2024</a:t>
             </a:fld>
             <a:endParaRPr lang="de-DE"/>
           </a:p>
@@ -3321,7 +3337,7 @@
           <a:p>
             <a:fld id="{959724B9-AEF0-41ED-A786-F2279D2B520B}" type="datetimeFigureOut">
               <a:rPr lang="de-DE" smtClean="0"/>
-              <a:t>10.07.2024</a:t>
+              <a:t>24.07.2024</a:t>
             </a:fld>
             <a:endParaRPr lang="de-DE"/>
           </a:p>
@@ -3797,6 +3813,10 @@
           <a:bodyPr/>
           <a:lstStyle/>
           <a:p>
+            <a:r>
+              <a:rPr lang="de-DE"/>
+              <a:t>24-07.2024</a:t>
+            </a:r>
             <a:endParaRPr lang="de-DE" dirty="0"/>
           </a:p>
         </p:txBody>

</xml_diff>